<commit_message>
Added apple watch to ppt, refresh button
</commit_message>
<xml_diff>
--- a/HealthKit.pptx
+++ b/HealthKit.pptx
@@ -5,7 +5,7 @@
     <p:sldMasterId id="2147483648" r:id="rId1"/>
   </p:sldMasterIdLst>
   <p:notesMasterIdLst>
-    <p:notesMasterId r:id="rId10"/>
+    <p:notesMasterId r:id="rId11"/>
   </p:notesMasterIdLst>
   <p:sldIdLst>
     <p:sldId id="256" r:id="rId2"/>
@@ -16,6 +16,7 @@
     <p:sldId id="262" r:id="rId7"/>
     <p:sldId id="263" r:id="rId8"/>
     <p:sldId id="264" r:id="rId9"/>
+    <p:sldId id="265" r:id="rId10"/>
   </p:sldIdLst>
   <p:sldSz cx="9144000" cy="6858000" type="screen4x3"/>
   <p:notesSz cx="6858000" cy="9144000"/>
@@ -5376,9 +5377,39 @@
           <a:chExt cx="0" cy="0"/>
         </a:xfrm>
       </p:grpSpPr>
+      <p:sp>
+        <p:nvSpPr>
+          <p:cNvPr id="3" name="TextBox 2"/>
+          <p:cNvSpPr txBox="1"/>
+          <p:nvPr/>
+        </p:nvSpPr>
+        <p:spPr>
+          <a:xfrm>
+            <a:off x="1098850" y="513681"/>
+            <a:ext cx="4324045" cy="584776"/>
+          </a:xfrm>
+          <a:prstGeom prst="rect">
+            <a:avLst/>
+          </a:prstGeom>
+          <a:noFill/>
+        </p:spPr>
+        <p:txBody>
+          <a:bodyPr wrap="square" rtlCol="0">
+            <a:spAutoFit/>
+          </a:bodyPr>
+          <a:lstStyle/>
+          <a:p>
+            <a:r>
+              <a:rPr lang="en-US" sz="3200" dirty="0" err="1" smtClean="0"/>
+              <a:t>HKQuantityType</a:t>
+            </a:r>
+            <a:endParaRPr lang="en-US" sz="3200" dirty="0"/>
+          </a:p>
+        </p:txBody>
+      </p:sp>
       <p:pic>
         <p:nvPicPr>
-          <p:cNvPr id="6" name="Picture 5" descr="Screen Shot 2016-05-31 at 23.04.25.png"/>
+          <p:cNvPr id="4" name="Picture 3" descr="450500e84c47f4f26f41891bca991e726133ebf7.png"/>
           <p:cNvPicPr>
             <a:picLocks noChangeAspect="1"/>
           </p:cNvPicPr>
@@ -5398,8 +5429,8 @@
         </p:blipFill>
         <p:spPr>
           <a:xfrm>
-            <a:off x="0" y="466174"/>
-            <a:ext cx="9144000" cy="5909575"/>
+            <a:off x="0" y="1412375"/>
+            <a:ext cx="9144000" cy="4409345"/>
           </a:xfrm>
           <a:prstGeom prst="rect">
             <a:avLst/>
@@ -5460,7 +5491,9 @@
           </a:xfrm>
         </p:spPr>
         <p:txBody>
-          <a:bodyPr/>
+          <a:bodyPr>
+            <a:normAutofit/>
+          </a:bodyPr>
           <a:lstStyle/>
           <a:p>
             <a:pPr marL="0" indent="0">
@@ -5478,7 +5511,10 @@
               <a:buChar char="-"/>
             </a:pPr>
             <a:r>
-              <a:rPr lang="en-US" sz="2800" i="1" dirty="0" smtClean="0"/>
+              <a:rPr lang="en-US" sz="2800" dirty="0" smtClean="0">
+                <a:latin typeface="Apple Symbols"/>
+                <a:cs typeface="Apple Symbols"/>
+              </a:rPr>
               <a:t>Every quantity type has a type identifier</a:t>
             </a:r>
           </a:p>
@@ -5488,7 +5524,10 @@
               <a:buChar char="-"/>
             </a:pPr>
             <a:r>
-              <a:rPr lang="en-US" sz="2800" i="1" dirty="0" smtClean="0"/>
+              <a:rPr lang="en-US" sz="2800" dirty="0" smtClean="0">
+                <a:latin typeface="Apple Symbols"/>
+                <a:cs typeface="Apple Symbols"/>
+              </a:rPr>
               <a:t>You cannot create your own types</a:t>
             </a:r>
           </a:p>
@@ -5517,6 +5556,8 @@
                 <a:solidFill>
                   <a:srgbClr val="FFFF00"/>
                 </a:solidFill>
+                <a:latin typeface="Apple Symbols"/>
+                <a:cs typeface="Apple Symbols"/>
               </a:rPr>
               <a:t>HKQuantityTypeIdentifier</a:t>
             </a:r>
@@ -5527,6 +5568,8 @@
                     <a:lumMod val="75000"/>
                   </a:schemeClr>
                 </a:solidFill>
+                <a:latin typeface="Apple Symbols"/>
+                <a:cs typeface="Apple Symbols"/>
               </a:rPr>
               <a:t>HeartRate</a:t>
             </a:r>
@@ -5536,6 +5579,8 @@
                   <a:lumMod val="75000"/>
                 </a:schemeClr>
               </a:solidFill>
+              <a:latin typeface="Apple Symbols"/>
+              <a:cs typeface="Apple Symbols"/>
             </a:endParaRPr>
           </a:p>
           <a:p>
@@ -5547,6 +5592,8 @@
                 <a:solidFill>
                   <a:srgbClr val="FFFF00"/>
                 </a:solidFill>
+                <a:latin typeface="Apple Symbols"/>
+                <a:cs typeface="Apple Symbols"/>
               </a:rPr>
               <a:t>HKObjectType</a:t>
             </a:r>
@@ -5555,6 +5602,8 @@
                 <a:solidFill>
                   <a:srgbClr val="FFFF00"/>
                 </a:solidFill>
+                <a:latin typeface="Apple Symbols"/>
+                <a:cs typeface="Apple Symbols"/>
               </a:rPr>
               <a:t> </a:t>
             </a:r>
@@ -5563,6 +5612,8 @@
                 <a:solidFill>
                   <a:srgbClr val="FFFF00"/>
                 </a:solidFill>
+                <a:latin typeface="Apple Symbols"/>
+                <a:cs typeface="Apple Symbols"/>
               </a:rPr>
               <a:t>subcalss</a:t>
             </a:r>
@@ -5571,6 +5622,8 @@
                 <a:solidFill>
                   <a:srgbClr val="FFFF00"/>
                 </a:solidFill>
+                <a:latin typeface="Apple Symbols"/>
+                <a:cs typeface="Apple Symbols"/>
               </a:rPr>
               <a:t>	      </a:t>
             </a:r>
@@ -5579,9 +5632,110 @@
                 <a:solidFill>
                   <a:srgbClr val="31859C"/>
                 </a:solidFill>
+                <a:latin typeface="Apple Symbols"/>
+                <a:cs typeface="Apple Symbols"/>
               </a:rPr>
               <a:t>  Type name</a:t>
             </a:r>
+          </a:p>
+          <a:p>
+            <a:pPr marL="0" indent="0">
+              <a:buNone/>
+            </a:pPr>
+            <a:endParaRPr lang="en-US" sz="2400" i="1" dirty="0">
+              <a:solidFill>
+                <a:srgbClr val="31859C"/>
+              </a:solidFill>
+            </a:endParaRPr>
+          </a:p>
+          <a:p>
+            <a:pPr marL="0" indent="0">
+              <a:buNone/>
+            </a:pPr>
+            <a:r>
+              <a:rPr lang="en-US" dirty="0" smtClean="0"/>
+              <a:t>Creation</a:t>
+            </a:r>
+            <a:r>
+              <a:rPr lang="en-US" sz="2800" dirty="0" smtClean="0"/>
+              <a:t>:</a:t>
+            </a:r>
+          </a:p>
+          <a:p>
+            <a:pPr marL="0" indent="0">
+              <a:buNone/>
+            </a:pPr>
+            <a:r>
+              <a:rPr lang="en-US" sz="2800" dirty="0" smtClean="0"/>
+              <a:t>3 constructors, one for each quantity type</a:t>
+            </a:r>
+          </a:p>
+          <a:p>
+            <a:pPr marL="0" indent="0">
+              <a:buNone/>
+            </a:pPr>
+            <a:r>
+              <a:rPr lang="en-US" sz="2400" dirty="0" smtClean="0">
+                <a:latin typeface="Apple Symbols"/>
+                <a:cs typeface="Apple Symbols"/>
+              </a:rPr>
+              <a:t>Ex. +(</a:t>
+            </a:r>
+            <a:r>
+              <a:rPr lang="en-US" sz="2400" dirty="0" err="1" smtClean="0">
+                <a:latin typeface="Apple Symbols"/>
+                <a:cs typeface="Apple Symbols"/>
+              </a:rPr>
+              <a:t>HKQuantityType</a:t>
+            </a:r>
+            <a:r>
+              <a:rPr lang="en-US" sz="2400" dirty="0" smtClean="0">
+                <a:latin typeface="Apple Symbols"/>
+                <a:cs typeface="Apple Symbols"/>
+              </a:rPr>
+              <a:t> *)</a:t>
+            </a:r>
+            <a:r>
+              <a:rPr lang="en-US" sz="2400" dirty="0" err="1" smtClean="0">
+                <a:latin typeface="Apple Symbols"/>
+                <a:cs typeface="Apple Symbols"/>
+              </a:rPr>
+              <a:t>quantityTypeForIdentifier</a:t>
+            </a:r>
+            <a:r>
+              <a:rPr lang="en-US" sz="2400" dirty="0" smtClean="0">
+                <a:latin typeface="Apple Symbols"/>
+                <a:cs typeface="Apple Symbols"/>
+                <a:sym typeface="Wingdings"/>
+              </a:rPr>
+              <a:t>: (</a:t>
+            </a:r>
+            <a:r>
+              <a:rPr lang="en-US" sz="2400" dirty="0" err="1" smtClean="0">
+                <a:latin typeface="Apple Symbols"/>
+                <a:cs typeface="Apple Symbols"/>
+                <a:sym typeface="Wingdings"/>
+              </a:rPr>
+              <a:t>NSString</a:t>
+            </a:r>
+            <a:r>
+              <a:rPr lang="en-US" sz="2400" dirty="0" smtClean="0">
+                <a:latin typeface="Apple Symbols"/>
+                <a:cs typeface="Apple Symbols"/>
+                <a:sym typeface="Wingdings"/>
+              </a:rPr>
+              <a:t> *)identifier</a:t>
+            </a:r>
+            <a:endParaRPr lang="en-US" sz="2400" dirty="0" smtClean="0">
+              <a:latin typeface="Apple Symbols"/>
+              <a:cs typeface="Apple Symbols"/>
+            </a:endParaRPr>
+          </a:p>
+          <a:p>
+            <a:pPr marL="0" indent="0">
+              <a:buNone/>
+            </a:pPr>
+            <a:endParaRPr lang="en-US" sz="2800" dirty="0" smtClean="0"/>
           </a:p>
           <a:p>
             <a:pPr marL="0" indent="0">
@@ -5601,6 +5755,173 @@
   <p:clrMapOvr>
     <a:masterClrMapping/>
   </p:clrMapOvr>
+  <p:timing>
+    <p:tnLst>
+      <p:par>
+        <p:cTn xmlns:p14="http://schemas.microsoft.com/office/powerpoint/2010/main" id="1" dur="indefinite" restart="never" nodeType="tmRoot"/>
+      </p:par>
+    </p:tnLst>
+  </p:timing>
+</p:sld>
+</file>
+
+<file path=ppt/slides/slide9.xml><?xml version="1.0" encoding="utf-8"?>
+<p:sld xmlns:a="http://schemas.openxmlformats.org/drawingml/2006/main" xmlns:r="http://schemas.openxmlformats.org/officeDocument/2006/relationships" xmlns:p="http://schemas.openxmlformats.org/presentationml/2006/main">
+  <p:cSld>
+    <p:spTree>
+      <p:nvGrpSpPr>
+        <p:cNvPr id="1" name=""/>
+        <p:cNvGrpSpPr/>
+        <p:nvPr/>
+      </p:nvGrpSpPr>
+      <p:grpSpPr>
+        <a:xfrm>
+          <a:off x="0" y="0"/>
+          <a:ext cx="0" cy="0"/>
+          <a:chOff x="0" y="0"/>
+          <a:chExt cx="0" cy="0"/>
+        </a:xfrm>
+      </p:grpSpPr>
+      <p:sp>
+        <p:nvSpPr>
+          <p:cNvPr id="3" name="Content Placeholder 2"/>
+          <p:cNvSpPr>
+            <a:spLocks noGrp="1"/>
+          </p:cNvSpPr>
+          <p:nvPr>
+            <p:ph idx="1"/>
+          </p:nvPr>
+        </p:nvSpPr>
+        <p:spPr>
+          <a:xfrm>
+            <a:off x="457200" y="342454"/>
+            <a:ext cx="4937153" cy="6235518"/>
+          </a:xfrm>
+        </p:spPr>
+        <p:txBody>
+          <a:bodyPr/>
+          <a:lstStyle/>
+          <a:p>
+            <a:pPr marL="0" indent="0">
+              <a:buNone/>
+            </a:pPr>
+            <a:r>
+              <a:rPr lang="en-US" dirty="0" err="1" smtClean="0"/>
+              <a:t>HealthKit</a:t>
+            </a:r>
+            <a:r>
+              <a:rPr lang="en-US" dirty="0" smtClean="0"/>
+              <a:t> + Apple watch</a:t>
+            </a:r>
+          </a:p>
+          <a:p>
+            <a:pPr marL="0" indent="0">
+              <a:buNone/>
+            </a:pPr>
+            <a:endParaRPr lang="en-US" dirty="0"/>
+          </a:p>
+          <a:p>
+            <a:r>
+              <a:rPr lang="en-US" sz="2400" dirty="0" smtClean="0"/>
+              <a:t>Recorded workout sessions on the apple watch are saved to </a:t>
+            </a:r>
+            <a:r>
+              <a:rPr lang="en-US" sz="2400" dirty="0" err="1" smtClean="0"/>
+              <a:t>healthkit</a:t>
+            </a:r>
+            <a:r>
+              <a:rPr lang="en-US" sz="2400" dirty="0" smtClean="0"/>
+              <a:t>.</a:t>
+            </a:r>
+          </a:p>
+          <a:p>
+            <a:endParaRPr lang="en-US" sz="2400" dirty="0"/>
+          </a:p>
+          <a:p>
+            <a:r>
+              <a:rPr lang="en-US" sz="2400" dirty="0" smtClean="0"/>
+              <a:t>Access to data such as,</a:t>
+            </a:r>
+          </a:p>
+          <a:p>
+            <a:pPr lvl="1"/>
+            <a:r>
+              <a:rPr lang="en-US" sz="2000" dirty="0" smtClean="0"/>
+              <a:t>Workout summary</a:t>
+            </a:r>
+          </a:p>
+          <a:p>
+            <a:pPr lvl="1"/>
+            <a:r>
+              <a:rPr lang="en-US" sz="2000" dirty="0" smtClean="0"/>
+              <a:t>Heart rate</a:t>
+            </a:r>
+          </a:p>
+          <a:p>
+            <a:pPr lvl="1"/>
+            <a:r>
+              <a:rPr lang="en-US" sz="2000" dirty="0" smtClean="0"/>
+              <a:t>Active energy burn</a:t>
+            </a:r>
+          </a:p>
+          <a:p>
+            <a:endParaRPr lang="en-US" sz="2400" dirty="0" smtClean="0"/>
+          </a:p>
+          <a:p>
+            <a:r>
+              <a:rPr lang="en-US" sz="2400" dirty="0" smtClean="0"/>
+              <a:t>Activity ring on apple watch</a:t>
+            </a:r>
+          </a:p>
+        </p:txBody>
+      </p:sp>
+      <p:pic>
+        <p:nvPicPr>
+          <p:cNvPr id="4" name="Picture 3" descr="healthkit-developer_2x.png"/>
+          <p:cNvPicPr>
+            <a:picLocks noChangeAspect="1"/>
+          </p:cNvPicPr>
+          <p:nvPr/>
+        </p:nvPicPr>
+        <p:blipFill>
+          <a:blip r:embed="rId2">
+            <a:extLst>
+              <a:ext uri="{28A0092B-C50C-407E-A947-70E740481C1C}">
+                <a14:useLocalDpi xmlns:a14="http://schemas.microsoft.com/office/drawing/2010/main" val="0"/>
+              </a:ext>
+            </a:extLst>
+          </a:blip>
+          <a:stretch>
+            <a:fillRect/>
+          </a:stretch>
+        </p:blipFill>
+        <p:spPr>
+          <a:xfrm>
+            <a:off x="5565603" y="642101"/>
+            <a:ext cx="3419740" cy="5935871"/>
+          </a:xfrm>
+          <a:prstGeom prst="rect">
+            <a:avLst/>
+          </a:prstGeom>
+        </p:spPr>
+      </p:pic>
+    </p:spTree>
+    <p:extLst>
+      <p:ext uri="{BB962C8B-B14F-4D97-AF65-F5344CB8AC3E}">
+        <p14:creationId xmlns:p14="http://schemas.microsoft.com/office/powerpoint/2010/main" val="561774305"/>
+      </p:ext>
+    </p:extLst>
+  </p:cSld>
+  <p:clrMapOvr>
+    <a:masterClrMapping/>
+  </p:clrMapOvr>
+  <p:timing>
+    <p:tnLst>
+      <p:par>
+        <p:cTn xmlns:p14="http://schemas.microsoft.com/office/powerpoint/2010/main" id="1" dur="indefinite" restart="never" nodeType="tmRoot"/>
+      </p:par>
+    </p:tnLst>
+  </p:timing>
 </p:sld>
 </file>
 

</xml_diff>

<commit_message>
energy update + PPT
</commit_message>
<xml_diff>
--- a/HealthKit.pptx
+++ b/HealthKit.pptx
@@ -5,7 +5,7 @@
     <p:sldMasterId id="2147483648" r:id="rId1"/>
   </p:sldMasterIdLst>
   <p:notesMasterIdLst>
-    <p:notesMasterId r:id="rId11"/>
+    <p:notesMasterId r:id="rId12"/>
   </p:notesMasterIdLst>
   <p:sldIdLst>
     <p:sldId id="256" r:id="rId2"/>
@@ -16,7 +16,8 @@
     <p:sldId id="262" r:id="rId7"/>
     <p:sldId id="263" r:id="rId8"/>
     <p:sldId id="264" r:id="rId9"/>
-    <p:sldId id="265" r:id="rId10"/>
+    <p:sldId id="266" r:id="rId10"/>
+    <p:sldId id="265" r:id="rId11"/>
   </p:sldIdLst>
   <p:sldSz cx="9144000" cy="6858000" type="screen4x3"/>
   <p:notesSz cx="6858000" cy="9144000"/>
@@ -200,7 +201,7 @@
           <a:p>
             <a:fld id="{E3F957BF-8924-9541-B4F4-1EAE3181562F}" type="datetimeFigureOut">
               <a:rPr lang="en-US" smtClean="0"/>
-              <a:t>01/06/16</a:t>
+              <a:t>02/06/16</a:t>
             </a:fld>
             <a:endParaRPr lang="en-US"/>
           </a:p>
@@ -649,7 +650,7 @@
           <a:p>
             <a:fld id="{6BFECD78-3C8E-49F2-8FAB-59489D168ABB}" type="datetimeFigureOut">
               <a:rPr lang="en-US" smtClean="0"/>
-              <a:t>01/06/16</a:t>
+              <a:t>02/06/16</a:t>
             </a:fld>
             <a:endParaRPr lang="en-US"/>
           </a:p>
@@ -819,7 +820,7 @@
           <a:p>
             <a:fld id="{6BFECD78-3C8E-49F2-8FAB-59489D168ABB}" type="datetimeFigureOut">
               <a:rPr lang="en-US" smtClean="0"/>
-              <a:t>01/06/16</a:t>
+              <a:t>02/06/16</a:t>
             </a:fld>
             <a:endParaRPr lang="en-US"/>
           </a:p>
@@ -999,7 +1000,7 @@
           <a:p>
             <a:fld id="{6BFECD78-3C8E-49F2-8FAB-59489D168ABB}" type="datetimeFigureOut">
               <a:rPr lang="en-US" smtClean="0"/>
-              <a:t>01/06/16</a:t>
+              <a:t>02/06/16</a:t>
             </a:fld>
             <a:endParaRPr lang="en-US"/>
           </a:p>
@@ -1169,7 +1170,7 @@
           <a:p>
             <a:fld id="{6BFECD78-3C8E-49F2-8FAB-59489D168ABB}" type="datetimeFigureOut">
               <a:rPr lang="en-US" smtClean="0"/>
-              <a:t>01/06/16</a:t>
+              <a:t>02/06/16</a:t>
             </a:fld>
             <a:endParaRPr lang="en-US"/>
           </a:p>
@@ -1415,7 +1416,7 @@
           <a:p>
             <a:fld id="{6BFECD78-3C8E-49F2-8FAB-59489D168ABB}" type="datetimeFigureOut">
               <a:rPr lang="en-US" smtClean="0"/>
-              <a:t>01/06/16</a:t>
+              <a:t>02/06/16</a:t>
             </a:fld>
             <a:endParaRPr lang="en-US"/>
           </a:p>
@@ -1703,7 +1704,7 @@
           <a:p>
             <a:fld id="{6BFECD78-3C8E-49F2-8FAB-59489D168ABB}" type="datetimeFigureOut">
               <a:rPr lang="en-US" smtClean="0"/>
-              <a:t>01/06/16</a:t>
+              <a:t>02/06/16</a:t>
             </a:fld>
             <a:endParaRPr lang="en-US"/>
           </a:p>
@@ -2125,7 +2126,7 @@
           <a:p>
             <a:fld id="{6BFECD78-3C8E-49F2-8FAB-59489D168ABB}" type="datetimeFigureOut">
               <a:rPr lang="en-US" smtClean="0"/>
-              <a:t>01/06/16</a:t>
+              <a:t>02/06/16</a:t>
             </a:fld>
             <a:endParaRPr lang="en-US"/>
           </a:p>
@@ -2243,7 +2244,7 @@
           <a:p>
             <a:fld id="{6BFECD78-3C8E-49F2-8FAB-59489D168ABB}" type="datetimeFigureOut">
               <a:rPr lang="en-US" smtClean="0"/>
-              <a:t>01/06/16</a:t>
+              <a:t>02/06/16</a:t>
             </a:fld>
             <a:endParaRPr lang="en-US"/>
           </a:p>
@@ -2338,7 +2339,7 @@
           <a:p>
             <a:fld id="{6BFECD78-3C8E-49F2-8FAB-59489D168ABB}" type="datetimeFigureOut">
               <a:rPr lang="en-US" smtClean="0"/>
-              <a:t>01/06/16</a:t>
+              <a:t>02/06/16</a:t>
             </a:fld>
             <a:endParaRPr lang="en-US"/>
           </a:p>
@@ -2615,7 +2616,7 @@
           <a:p>
             <a:fld id="{6BFECD78-3C8E-49F2-8FAB-59489D168ABB}" type="datetimeFigureOut">
               <a:rPr lang="en-US" smtClean="0"/>
-              <a:t>01/06/16</a:t>
+              <a:t>02/06/16</a:t>
             </a:fld>
             <a:endParaRPr lang="en-US"/>
           </a:p>
@@ -2872,7 +2873,7 @@
           <a:p>
             <a:fld id="{6BFECD78-3C8E-49F2-8FAB-59489D168ABB}" type="datetimeFigureOut">
               <a:rPr lang="en-US" smtClean="0"/>
-              <a:t>01/06/16</a:t>
+              <a:t>02/06/16</a:t>
             </a:fld>
             <a:endParaRPr lang="en-US"/>
           </a:p>
@@ -3085,7 +3086,7 @@
           <a:p>
             <a:fld id="{6BFECD78-3C8E-49F2-8FAB-59489D168ABB}" type="datetimeFigureOut">
               <a:rPr lang="en-US" smtClean="0"/>
-              <a:t>01/06/16</a:t>
+              <a:t>02/06/16</a:t>
             </a:fld>
             <a:endParaRPr lang="en-US"/>
           </a:p>
@@ -3544,6 +3545,166 @@
 </p:sld>
 </file>
 
+<file path=ppt/slides/slide10.xml><?xml version="1.0" encoding="utf-8"?>
+<p:sld xmlns:a="http://schemas.openxmlformats.org/drawingml/2006/main" xmlns:r="http://schemas.openxmlformats.org/officeDocument/2006/relationships" xmlns:p="http://schemas.openxmlformats.org/presentationml/2006/main">
+  <p:cSld>
+    <p:spTree>
+      <p:nvGrpSpPr>
+        <p:cNvPr id="1" name=""/>
+        <p:cNvGrpSpPr/>
+        <p:nvPr/>
+      </p:nvGrpSpPr>
+      <p:grpSpPr>
+        <a:xfrm>
+          <a:off x="0" y="0"/>
+          <a:ext cx="0" cy="0"/>
+          <a:chOff x="0" y="0"/>
+          <a:chExt cx="0" cy="0"/>
+        </a:xfrm>
+      </p:grpSpPr>
+      <p:sp>
+        <p:nvSpPr>
+          <p:cNvPr id="3" name="Content Placeholder 2"/>
+          <p:cNvSpPr>
+            <a:spLocks noGrp="1"/>
+          </p:cNvSpPr>
+          <p:nvPr>
+            <p:ph idx="1"/>
+          </p:nvPr>
+        </p:nvSpPr>
+        <p:spPr>
+          <a:xfrm>
+            <a:off x="457200" y="342454"/>
+            <a:ext cx="4937153" cy="6235518"/>
+          </a:xfrm>
+        </p:spPr>
+        <p:txBody>
+          <a:bodyPr/>
+          <a:lstStyle/>
+          <a:p>
+            <a:pPr marL="0" indent="0">
+              <a:buNone/>
+            </a:pPr>
+            <a:r>
+              <a:rPr lang="en-US" dirty="0" err="1" smtClean="0"/>
+              <a:t>HealthKit</a:t>
+            </a:r>
+            <a:r>
+              <a:rPr lang="en-US" dirty="0" smtClean="0"/>
+              <a:t> + Apple watch</a:t>
+            </a:r>
+          </a:p>
+          <a:p>
+            <a:pPr marL="0" indent="0">
+              <a:buNone/>
+            </a:pPr>
+            <a:endParaRPr lang="en-US" dirty="0"/>
+          </a:p>
+          <a:p>
+            <a:r>
+              <a:rPr lang="en-US" sz="2400" dirty="0" smtClean="0"/>
+              <a:t>Recorded workout sessions on the apple watch are saved to </a:t>
+            </a:r>
+            <a:r>
+              <a:rPr lang="en-US" sz="2400" dirty="0" err="1" smtClean="0"/>
+              <a:t>healthkit</a:t>
+            </a:r>
+            <a:r>
+              <a:rPr lang="en-US" sz="2400" dirty="0" smtClean="0"/>
+              <a:t>.</a:t>
+            </a:r>
+          </a:p>
+          <a:p>
+            <a:endParaRPr lang="en-US" sz="2400" dirty="0"/>
+          </a:p>
+          <a:p>
+            <a:r>
+              <a:rPr lang="en-US" sz="2400" dirty="0" smtClean="0"/>
+              <a:t>Access to data such as,</a:t>
+            </a:r>
+          </a:p>
+          <a:p>
+            <a:pPr lvl="1"/>
+            <a:r>
+              <a:rPr lang="en-US" sz="2000" dirty="0" smtClean="0"/>
+              <a:t>Workout summary</a:t>
+            </a:r>
+          </a:p>
+          <a:p>
+            <a:pPr lvl="1"/>
+            <a:r>
+              <a:rPr lang="en-US" sz="2000" dirty="0" smtClean="0"/>
+              <a:t>Heart rate</a:t>
+            </a:r>
+          </a:p>
+          <a:p>
+            <a:pPr lvl="1"/>
+            <a:r>
+              <a:rPr lang="en-US" sz="2000" dirty="0" smtClean="0"/>
+              <a:t>Active energy burn</a:t>
+            </a:r>
+          </a:p>
+          <a:p>
+            <a:endParaRPr lang="en-US" sz="2400" dirty="0" smtClean="0"/>
+          </a:p>
+          <a:p>
+            <a:r>
+              <a:rPr lang="en-US" sz="2400" dirty="0" smtClean="0"/>
+              <a:t>Activity ring on apple watch</a:t>
+            </a:r>
+          </a:p>
+        </p:txBody>
+      </p:sp>
+      <p:pic>
+        <p:nvPicPr>
+          <p:cNvPr id="4" name="Picture 3" descr="healthkit-developer_2x.png"/>
+          <p:cNvPicPr>
+            <a:picLocks noChangeAspect="1"/>
+          </p:cNvPicPr>
+          <p:nvPr/>
+        </p:nvPicPr>
+        <p:blipFill>
+          <a:blip r:embed="rId2">
+            <a:extLst>
+              <a:ext uri="{28A0092B-C50C-407E-A947-70E740481C1C}">
+                <a14:useLocalDpi xmlns:a14="http://schemas.microsoft.com/office/drawing/2010/main" val="0"/>
+              </a:ext>
+            </a:extLst>
+          </a:blip>
+          <a:stretch>
+            <a:fillRect/>
+          </a:stretch>
+        </p:blipFill>
+        <p:spPr>
+          <a:xfrm>
+            <a:off x="5565603" y="642101"/>
+            <a:ext cx="3419740" cy="5935871"/>
+          </a:xfrm>
+          <a:prstGeom prst="rect">
+            <a:avLst/>
+          </a:prstGeom>
+        </p:spPr>
+      </p:pic>
+    </p:spTree>
+    <p:extLst>
+      <p:ext uri="{BB962C8B-B14F-4D97-AF65-F5344CB8AC3E}">
+        <p14:creationId xmlns:p14="http://schemas.microsoft.com/office/powerpoint/2010/main" val="561774305"/>
+      </p:ext>
+    </p:extLst>
+  </p:cSld>
+  <p:clrMapOvr>
+    <a:masterClrMapping/>
+  </p:clrMapOvr>
+  <p:timing>
+    <p:tnLst>
+      <p:par>
+        <p:cTn xmlns:p14="http://schemas.microsoft.com/office/powerpoint/2010/main" id="1" dur="indefinite" restart="never" nodeType="tmRoot"/>
+      </p:par>
+    </p:tnLst>
+  </p:timing>
+</p:sld>
+</file>
+
 <file path=ppt/slides/slide2.xml><?xml version="1.0" encoding="utf-8"?>
 <p:sld xmlns:a="http://schemas.openxmlformats.org/drawingml/2006/main" xmlns:r="http://schemas.openxmlformats.org/officeDocument/2006/relationships" xmlns:p="http://schemas.openxmlformats.org/presentationml/2006/main">
   <p:cSld>
@@ -5784,100 +5945,40 @@
       </p:grpSpPr>
       <p:sp>
         <p:nvSpPr>
-          <p:cNvPr id="3" name="Content Placeholder 2"/>
-          <p:cNvSpPr>
-            <a:spLocks noGrp="1"/>
-          </p:cNvSpPr>
-          <p:nvPr>
-            <p:ph idx="1"/>
-          </p:nvPr>
-        </p:nvSpPr>
-        <p:spPr>
-          <a:xfrm>
-            <a:off x="457200" y="342454"/>
-            <a:ext cx="4937153" cy="6235518"/>
-          </a:xfrm>
-        </p:spPr>
-        <p:txBody>
-          <a:bodyPr/>
+          <p:cNvPr id="2" name="Title 1"/>
+          <p:cNvSpPr>
+            <a:spLocks noGrp="1"/>
+          </p:cNvSpPr>
+          <p:nvPr>
+            <p:ph type="title"/>
+          </p:nvPr>
+        </p:nvSpPr>
+        <p:spPr/>
+        <p:txBody>
+          <a:bodyPr>
+            <a:normAutofit fontScale="90000"/>
+          </a:bodyPr>
           <a:lstStyle/>
           <a:p>
-            <a:pPr marL="0" indent="0">
-              <a:buNone/>
-            </a:pPr>
+            <a:pPr algn="l"/>
             <a:r>
               <a:rPr lang="en-US" dirty="0" err="1" smtClean="0"/>
-              <a:t>HealthKit</a:t>
+              <a:t>HKObject</a:t>
             </a:r>
             <a:r>
               <a:rPr lang="en-US" dirty="0" smtClean="0"/>
-              <a:t> + Apple watch</a:t>
-            </a:r>
-          </a:p>
-          <a:p>
-            <a:pPr marL="0" indent="0">
-              <a:buNone/>
-            </a:pPr>
+              <a:t/>
+            </a:r>
+            <a:br>
+              <a:rPr lang="en-US" dirty="0" smtClean="0"/>
+            </a:br>
             <a:endParaRPr lang="en-US" dirty="0"/>
-          </a:p>
-          <a:p>
-            <a:r>
-              <a:rPr lang="en-US" sz="2400" dirty="0" smtClean="0"/>
-              <a:t>Recorded workout sessions on the apple watch are saved to </a:t>
-            </a:r>
-            <a:r>
-              <a:rPr lang="en-US" sz="2400" dirty="0" err="1" smtClean="0"/>
-              <a:t>healthkit</a:t>
-            </a:r>
-            <a:r>
-              <a:rPr lang="en-US" sz="2400" dirty="0" smtClean="0"/>
-              <a:t>.</a:t>
-            </a:r>
-          </a:p>
-          <a:p>
-            <a:endParaRPr lang="en-US" sz="2400" dirty="0"/>
-          </a:p>
-          <a:p>
-            <a:r>
-              <a:rPr lang="en-US" sz="2400" dirty="0" smtClean="0"/>
-              <a:t>Access to data such as,</a:t>
-            </a:r>
-          </a:p>
-          <a:p>
-            <a:pPr lvl="1"/>
-            <a:r>
-              <a:rPr lang="en-US" sz="2000" dirty="0" smtClean="0"/>
-              <a:t>Workout summary</a:t>
-            </a:r>
-          </a:p>
-          <a:p>
-            <a:pPr lvl="1"/>
-            <a:r>
-              <a:rPr lang="en-US" sz="2000" dirty="0" smtClean="0"/>
-              <a:t>Heart rate</a:t>
-            </a:r>
-          </a:p>
-          <a:p>
-            <a:pPr lvl="1"/>
-            <a:r>
-              <a:rPr lang="en-US" sz="2000" dirty="0" smtClean="0"/>
-              <a:t>Active energy burn</a:t>
-            </a:r>
-          </a:p>
-          <a:p>
-            <a:endParaRPr lang="en-US" sz="2400" dirty="0" smtClean="0"/>
-          </a:p>
-          <a:p>
-            <a:r>
-              <a:rPr lang="en-US" sz="2400" dirty="0" smtClean="0"/>
-              <a:t>Activity ring on apple watch</a:t>
-            </a:r>
           </a:p>
         </p:txBody>
       </p:sp>
       <p:pic>
         <p:nvPicPr>
-          <p:cNvPr id="4" name="Picture 3" descr="healthkit-developer_2x.png"/>
+          <p:cNvPr id="4" name="Picture 3" descr="hkobject.png"/>
           <p:cNvPicPr>
             <a:picLocks noChangeAspect="1"/>
           </p:cNvPicPr>
@@ -5897,8 +5998,8 @@
         </p:blipFill>
         <p:spPr>
           <a:xfrm>
-            <a:off x="5565603" y="642101"/>
-            <a:ext cx="3419740" cy="5935871"/>
+            <a:off x="457200" y="1014877"/>
+            <a:ext cx="8267700" cy="5486400"/>
           </a:xfrm>
           <a:prstGeom prst="rect">
             <a:avLst/>
@@ -5908,20 +6009,13 @@
     </p:spTree>
     <p:extLst>
       <p:ext uri="{BB962C8B-B14F-4D97-AF65-F5344CB8AC3E}">
-        <p14:creationId xmlns:p14="http://schemas.microsoft.com/office/powerpoint/2010/main" val="561774305"/>
+        <p14:creationId xmlns:p14="http://schemas.microsoft.com/office/powerpoint/2010/main" val="4128387421"/>
       </p:ext>
     </p:extLst>
   </p:cSld>
   <p:clrMapOvr>
     <a:masterClrMapping/>
   </p:clrMapOvr>
-  <p:timing>
-    <p:tnLst>
-      <p:par>
-        <p:cTn xmlns:p14="http://schemas.microsoft.com/office/powerpoint/2010/main" id="1" dur="indefinite" restart="never" nodeType="tmRoot"/>
-      </p:par>
-    </p:tnLst>
-  </p:timing>
 </p:sld>
 </file>
 

</xml_diff>